<commit_message>
Plus de pubs :'(
</commit_message>
<xml_diff>
--- a/Projet_management.pptx
+++ b/Projet_management.pptx
@@ -1826,7 +1826,7 @@
           <a:p>
             <a:fld id="{C4B3B152-B06D-41AD-A7A3-90E7C0B564BC}" type="datetimeFigureOut">
               <a:rPr lang="fr-FR" smtClean="0"/>
-              <a:t>18/10/2016</a:t>
+              <a:t>20/10/2016</a:t>
             </a:fld>
             <a:endParaRPr lang="fr-FR"/>
           </a:p>
@@ -2222,7 +2222,7 @@
           <a:p>
             <a:fld id="{F11BACCC-A287-4E2C-8B2E-77AA0172090A}" type="datetimeFigureOut">
               <a:rPr lang="fr-FR" smtClean="0"/>
-              <a:t>18/10/2016</a:t>
+              <a:t>20/10/2016</a:t>
             </a:fld>
             <a:endParaRPr lang="fr-FR"/>
           </a:p>
@@ -2390,7 +2390,7 @@
           <a:p>
             <a:fld id="{F11BACCC-A287-4E2C-8B2E-77AA0172090A}" type="datetimeFigureOut">
               <a:rPr lang="fr-FR" smtClean="0"/>
-              <a:t>18/10/2016</a:t>
+              <a:t>20/10/2016</a:t>
             </a:fld>
             <a:endParaRPr lang="fr-FR"/>
           </a:p>
@@ -2568,7 +2568,7 @@
           <a:p>
             <a:fld id="{F11BACCC-A287-4E2C-8B2E-77AA0172090A}" type="datetimeFigureOut">
               <a:rPr lang="fr-FR" smtClean="0"/>
-              <a:t>18/10/2016</a:t>
+              <a:t>20/10/2016</a:t>
             </a:fld>
             <a:endParaRPr lang="fr-FR"/>
           </a:p>
@@ -2736,7 +2736,7 @@
           <a:p>
             <a:fld id="{F11BACCC-A287-4E2C-8B2E-77AA0172090A}" type="datetimeFigureOut">
               <a:rPr lang="fr-FR" smtClean="0"/>
-              <a:t>18/10/2016</a:t>
+              <a:t>20/10/2016</a:t>
             </a:fld>
             <a:endParaRPr lang="fr-FR"/>
           </a:p>
@@ -2981,7 +2981,7 @@
           <a:p>
             <a:fld id="{F11BACCC-A287-4E2C-8B2E-77AA0172090A}" type="datetimeFigureOut">
               <a:rPr lang="fr-FR" smtClean="0"/>
-              <a:t>18/10/2016</a:t>
+              <a:t>20/10/2016</a:t>
             </a:fld>
             <a:endParaRPr lang="fr-FR"/>
           </a:p>
@@ -3210,7 +3210,7 @@
           <a:p>
             <a:fld id="{F11BACCC-A287-4E2C-8B2E-77AA0172090A}" type="datetimeFigureOut">
               <a:rPr lang="fr-FR" smtClean="0"/>
-              <a:t>18/10/2016</a:t>
+              <a:t>20/10/2016</a:t>
             </a:fld>
             <a:endParaRPr lang="fr-FR"/>
           </a:p>
@@ -3574,7 +3574,7 @@
           <a:p>
             <a:fld id="{F11BACCC-A287-4E2C-8B2E-77AA0172090A}" type="datetimeFigureOut">
               <a:rPr lang="fr-FR" smtClean="0"/>
-              <a:t>18/10/2016</a:t>
+              <a:t>20/10/2016</a:t>
             </a:fld>
             <a:endParaRPr lang="fr-FR"/>
           </a:p>
@@ -3691,7 +3691,7 @@
           <a:p>
             <a:fld id="{F11BACCC-A287-4E2C-8B2E-77AA0172090A}" type="datetimeFigureOut">
               <a:rPr lang="fr-FR" smtClean="0"/>
-              <a:t>18/10/2016</a:t>
+              <a:t>20/10/2016</a:t>
             </a:fld>
             <a:endParaRPr lang="fr-FR"/>
           </a:p>
@@ -3786,7 +3786,7 @@
           <a:p>
             <a:fld id="{F11BACCC-A287-4E2C-8B2E-77AA0172090A}" type="datetimeFigureOut">
               <a:rPr lang="fr-FR" smtClean="0"/>
-              <a:t>18/10/2016</a:t>
+              <a:t>20/10/2016</a:t>
             </a:fld>
             <a:endParaRPr lang="fr-FR"/>
           </a:p>
@@ -4061,7 +4061,7 @@
           <a:p>
             <a:fld id="{F11BACCC-A287-4E2C-8B2E-77AA0172090A}" type="datetimeFigureOut">
               <a:rPr lang="fr-FR" smtClean="0"/>
-              <a:t>18/10/2016</a:t>
+              <a:t>20/10/2016</a:t>
             </a:fld>
             <a:endParaRPr lang="fr-FR"/>
           </a:p>
@@ -4313,7 +4313,7 @@
           <a:p>
             <a:fld id="{F11BACCC-A287-4E2C-8B2E-77AA0172090A}" type="datetimeFigureOut">
               <a:rPr lang="fr-FR" smtClean="0"/>
-              <a:t>18/10/2016</a:t>
+              <a:t>20/10/2016</a:t>
             </a:fld>
             <a:endParaRPr lang="fr-FR"/>
           </a:p>
@@ -4524,7 +4524,7 @@
           <a:p>
             <a:fld id="{F11BACCC-A287-4E2C-8B2E-77AA0172090A}" type="datetimeFigureOut">
               <a:rPr lang="fr-FR" smtClean="0"/>
-              <a:t>18/10/2016</a:t>
+              <a:t>20/10/2016</a:t>
             </a:fld>
             <a:endParaRPr lang="fr-FR"/>
           </a:p>
@@ -5701,259 +5701,6 @@
             <a:r>
               <a:rPr lang="fr-FR" sz="1200" dirty="0"/>
               <a:t>Nom de l’appli</a:t>
-            </a:r>
-          </a:p>
-        </p:txBody>
-      </p:sp>
-      <p:sp>
-        <p:nvSpPr>
-          <p:cNvPr id="22" name="Rectangle 21"/>
-          <p:cNvSpPr/>
-          <p:nvPr/>
-        </p:nvSpPr>
-        <p:spPr>
-          <a:xfrm>
-            <a:off x="3320971" y="5661660"/>
-            <a:ext cx="3705290" cy="708186"/>
-          </a:xfrm>
-          <a:prstGeom prst="rect">
-            <a:avLst/>
-          </a:prstGeom>
-          <a:noFill/>
-          <a:ln>
-            <a:solidFill>
-              <a:schemeClr val="tx1"/>
-            </a:solidFill>
-          </a:ln>
-        </p:spPr>
-        <p:style>
-          <a:lnRef idx="2">
-            <a:schemeClr val="accent1">
-              <a:shade val="50000"/>
-            </a:schemeClr>
-          </a:lnRef>
-          <a:fillRef idx="1">
-            <a:schemeClr val="accent1"/>
-          </a:fillRef>
-          <a:effectRef idx="0">
-            <a:schemeClr val="accent1"/>
-          </a:effectRef>
-          <a:fontRef idx="minor">
-            <a:schemeClr val="lt1"/>
-          </a:fontRef>
-        </p:style>
-        <p:txBody>
-          <a:bodyPr rtlCol="0" anchor="ctr"/>
-          <a:lstStyle/>
-          <a:p>
-            <a:pPr algn="ctr"/>
-            <a:r>
-              <a:rPr lang="fr-FR" sz="2800" b="1" dirty="0">
-                <a:ln w="0"/>
-                <a:solidFill>
-                  <a:schemeClr val="tx1"/>
-                </a:solidFill>
-                <a:effectLst>
-                  <a:outerShdw blurRad="38100" dist="19050" dir="2700000" algn="tl" rotWithShape="0">
-                    <a:schemeClr val="dk1">
-                      <a:alpha val="40000"/>
-                    </a:schemeClr>
-                  </a:outerShdw>
-                </a:effectLst>
-              </a:rPr>
-              <a:t>PUB </a:t>
-            </a:r>
-            <a:r>
-              <a:rPr lang="fr-FR" sz="2800" b="1" dirty="0" err="1">
-                <a:ln w="0"/>
-                <a:solidFill>
-                  <a:schemeClr val="tx1"/>
-                </a:solidFill>
-                <a:effectLst>
-                  <a:outerShdw blurRad="38100" dist="19050" dir="2700000" algn="tl" rotWithShape="0">
-                    <a:schemeClr val="dk1">
-                      <a:alpha val="40000"/>
-                    </a:schemeClr>
-                  </a:outerShdw>
-                </a:effectLst>
-              </a:rPr>
-              <a:t>PUB</a:t>
-            </a:r>
-            <a:r>
-              <a:rPr lang="fr-FR" sz="2800" b="1" dirty="0">
-                <a:ln w="0"/>
-                <a:solidFill>
-                  <a:schemeClr val="tx1"/>
-                </a:solidFill>
-                <a:effectLst>
-                  <a:outerShdw blurRad="38100" dist="19050" dir="2700000" algn="tl" rotWithShape="0">
-                    <a:schemeClr val="dk1">
-                      <a:alpha val="40000"/>
-                    </a:schemeClr>
-                  </a:outerShdw>
-                </a:effectLst>
-              </a:rPr>
-              <a:t> </a:t>
-            </a:r>
-            <a:r>
-              <a:rPr lang="fr-FR" sz="2800" b="1" dirty="0" err="1">
-                <a:ln w="0"/>
-                <a:solidFill>
-                  <a:schemeClr val="tx1"/>
-                </a:solidFill>
-                <a:effectLst>
-                  <a:outerShdw blurRad="38100" dist="19050" dir="2700000" algn="tl" rotWithShape="0">
-                    <a:schemeClr val="dk1">
-                      <a:alpha val="40000"/>
-                    </a:schemeClr>
-                  </a:outerShdw>
-                </a:effectLst>
-              </a:rPr>
-              <a:t>PUB</a:t>
-            </a:r>
-            <a:r>
-              <a:rPr lang="fr-FR" sz="2800" b="1" dirty="0">
-                <a:ln w="0"/>
-                <a:solidFill>
-                  <a:schemeClr val="tx1"/>
-                </a:solidFill>
-                <a:effectLst>
-                  <a:outerShdw blurRad="38100" dist="19050" dir="2700000" algn="tl" rotWithShape="0">
-                    <a:schemeClr val="dk1">
-                      <a:alpha val="40000"/>
-                    </a:schemeClr>
-                  </a:outerShdw>
-                </a:effectLst>
-              </a:rPr>
-              <a:t> </a:t>
-            </a:r>
-            <a:r>
-              <a:rPr lang="fr-FR" sz="2800" b="1" dirty="0" err="1">
-                <a:ln w="0"/>
-                <a:solidFill>
-                  <a:schemeClr val="tx1"/>
-                </a:solidFill>
-                <a:effectLst>
-                  <a:outerShdw blurRad="38100" dist="19050" dir="2700000" algn="tl" rotWithShape="0">
-                    <a:schemeClr val="dk1">
-                      <a:alpha val="40000"/>
-                    </a:schemeClr>
-                  </a:outerShdw>
-                </a:effectLst>
-              </a:rPr>
-              <a:t>PUB</a:t>
-            </a:r>
-            <a:r>
-              <a:rPr lang="fr-FR" sz="2800" b="1" dirty="0">
-                <a:ln w="0"/>
-                <a:solidFill>
-                  <a:schemeClr val="tx1"/>
-                </a:solidFill>
-                <a:effectLst>
-                  <a:outerShdw blurRad="38100" dist="19050" dir="2700000" algn="tl" rotWithShape="0">
-                    <a:schemeClr val="dk1">
-                      <a:alpha val="40000"/>
-                    </a:schemeClr>
-                  </a:outerShdw>
-                </a:effectLst>
-              </a:rPr>
-              <a:t> </a:t>
-            </a:r>
-            <a:r>
-              <a:rPr lang="fr-FR" sz="2800" b="1" dirty="0" err="1">
-                <a:ln w="0"/>
-                <a:solidFill>
-                  <a:schemeClr val="tx1"/>
-                </a:solidFill>
-                <a:effectLst>
-                  <a:outerShdw blurRad="38100" dist="19050" dir="2700000" algn="tl" rotWithShape="0">
-                    <a:schemeClr val="dk1">
-                      <a:alpha val="40000"/>
-                    </a:schemeClr>
-                  </a:outerShdw>
-                </a:effectLst>
-              </a:rPr>
-              <a:t>PUB</a:t>
-            </a:r>
-            <a:endParaRPr lang="fr-FR" b="1" dirty="0">
-              <a:ln w="0"/>
-              <a:solidFill>
-                <a:schemeClr val="tx1"/>
-              </a:solidFill>
-              <a:effectLst>
-                <a:outerShdw blurRad="38100" dist="19050" dir="2700000" algn="tl" rotWithShape="0">
-                  <a:schemeClr val="dk1">
-                    <a:alpha val="40000"/>
-                  </a:schemeClr>
-                </a:outerShdw>
-              </a:effectLst>
-            </a:endParaRPr>
-          </a:p>
-        </p:txBody>
-      </p:sp>
-      <p:cxnSp>
-        <p:nvCxnSpPr>
-          <p:cNvPr id="23" name="Connecteur droit avec flèche 22"/>
-          <p:cNvCxnSpPr>
-            <a:endCxn id="22" idx="3"/>
-          </p:cNvCxnSpPr>
-          <p:nvPr/>
-        </p:nvCxnSpPr>
-        <p:spPr>
-          <a:xfrm flipH="1" flipV="1">
-            <a:off x="7026261" y="6015753"/>
-            <a:ext cx="274652" cy="396"/>
-          </a:xfrm>
-          <a:prstGeom prst="straightConnector1">
-            <a:avLst/>
-          </a:prstGeom>
-          <a:ln w="12700">
-            <a:solidFill>
-              <a:schemeClr val="tx1"/>
-            </a:solidFill>
-            <a:tailEnd type="triangle"/>
-          </a:ln>
-        </p:spPr>
-        <p:style>
-          <a:lnRef idx="1">
-            <a:schemeClr val="accent1"/>
-          </a:lnRef>
-          <a:fillRef idx="0">
-            <a:schemeClr val="accent1"/>
-          </a:fillRef>
-          <a:effectRef idx="0">
-            <a:schemeClr val="accent1"/>
-          </a:effectRef>
-          <a:fontRef idx="minor">
-            <a:schemeClr val="tx1"/>
-          </a:fontRef>
-        </p:style>
-      </p:cxnSp>
-      <p:sp>
-        <p:nvSpPr>
-          <p:cNvPr id="24" name="ZoneTexte 23"/>
-          <p:cNvSpPr txBox="1"/>
-          <p:nvPr/>
-        </p:nvSpPr>
-        <p:spPr>
-          <a:xfrm>
-            <a:off x="7300880" y="5784920"/>
-            <a:ext cx="1965040" cy="461665"/>
-          </a:xfrm>
-          <a:prstGeom prst="rect">
-            <a:avLst/>
-          </a:prstGeom>
-          <a:noFill/>
-        </p:spPr>
-        <p:txBody>
-          <a:bodyPr wrap="square" rtlCol="0">
-            <a:spAutoFit/>
-          </a:bodyPr>
-          <a:lstStyle/>
-          <a:p>
-            <a:r>
-              <a:rPr lang="fr-FR" sz="1200" dirty="0"/>
-              <a:t>Bandeau de pub pour se faire de la #money OKLM</a:t>
             </a:r>
           </a:p>
         </p:txBody>

</xml_diff>